<commit_message>
Added the new flow chart
</commit_message>
<xml_diff>
--- a/Manuscript/Figures/04_METHODS_VRTs.pptx
+++ b/Manuscript/Figures/04_METHODS_VRTs.pptx
@@ -112,14 +112,6 @@
 </p:presentation>
 </file>
 
-<file path=ppt/revisionInfo.xml><?xml version="1.0" encoding="utf-8"?>
-<p1510:revInfo xmlns:a="http://schemas.openxmlformats.org/drawingml/2006/main" xmlns:r="http://schemas.openxmlformats.org/officeDocument/2006/relationships" xmlns:p1510="http://schemas.microsoft.com/office/powerpoint/2015/10/main">
-  <p1510:revLst>
-    <p1510:client id="{E2B223F2-0B33-4F85-811E-48E98266BFC0}" v="19" dt="2023-10-15T22:05:09.653"/>
-  </p1510:revLst>
-</p1510:revInfo>
-</file>
-
 <file path=ppt/changesInfos/changesInfo1.xml><?xml version="1.0" encoding="utf-8"?>
 <pc:chgInfo xmlns:a="http://schemas.openxmlformats.org/drawingml/2006/main" xmlns:r="http://schemas.openxmlformats.org/officeDocument/2006/relationships" xmlns:ac="http://schemas.microsoft.com/office/drawing/2013/main/command" xmlns:pc="http://schemas.microsoft.com/office/powerpoint/2013/main/command">
   <pc:docChgLst>
@@ -837,6 +829,86 @@
             <pc:docMk/>
             <pc:sldMk cId="3183180916" sldId="256"/>
             <ac:cxnSpMk id="164" creationId="{9E9C3FCA-6E28-499A-8CFF-B660935050B6}"/>
+          </ac:cxnSpMkLst>
+        </pc:cxnChg>
+      </pc:sldChg>
+    </pc:docChg>
+  </pc:docChgLst>
+  <pc:docChgLst>
+    <pc:chgData name="Fatima Pillosu" userId="a6295d4dc9e22643" providerId="LiveId" clId="{537A97E6-967C-44B8-A46F-A25AF11477A2}"/>
+    <pc:docChg chg="custSel modSld">
+      <pc:chgData name="Fatima Pillosu" userId="a6295d4dc9e22643" providerId="LiveId" clId="{537A97E6-967C-44B8-A46F-A25AF11477A2}" dt="2023-11-02T13:37:34.840" v="30" actId="1035"/>
+      <pc:docMkLst>
+        <pc:docMk/>
+      </pc:docMkLst>
+      <pc:sldChg chg="delSp modSp mod">
+        <pc:chgData name="Fatima Pillosu" userId="a6295d4dc9e22643" providerId="LiveId" clId="{537A97E6-967C-44B8-A46F-A25AF11477A2}" dt="2023-11-02T13:37:34.840" v="30" actId="1035"/>
+        <pc:sldMkLst>
+          <pc:docMk/>
+          <pc:sldMk cId="2230501479" sldId="257"/>
+        </pc:sldMkLst>
+        <pc:spChg chg="mod">
+          <ac:chgData name="Fatima Pillosu" userId="a6295d4dc9e22643" providerId="LiveId" clId="{537A97E6-967C-44B8-A46F-A25AF11477A2}" dt="2023-11-02T13:37:34.840" v="30" actId="1035"/>
+          <ac:spMkLst>
+            <pc:docMk/>
+            <pc:sldMk cId="2230501479" sldId="257"/>
+            <ac:spMk id="301" creationId="{4A8ABDDE-1A98-C659-E0C0-70958461A6DD}"/>
+          </ac:spMkLst>
+        </pc:spChg>
+        <pc:spChg chg="del">
+          <ac:chgData name="Fatima Pillosu" userId="a6295d4dc9e22643" providerId="LiveId" clId="{537A97E6-967C-44B8-A46F-A25AF11477A2}" dt="2023-11-02T13:37:29.696" v="6" actId="478"/>
+          <ac:spMkLst>
+            <pc:docMk/>
+            <pc:sldMk cId="2230501479" sldId="257"/>
+            <ac:spMk id="304" creationId="{A6E8B822-9EEE-8BF3-9A9C-D65596F5E22B}"/>
+          </ac:spMkLst>
+        </pc:spChg>
+        <pc:spChg chg="del">
+          <ac:chgData name="Fatima Pillosu" userId="a6295d4dc9e22643" providerId="LiveId" clId="{537A97E6-967C-44B8-A46F-A25AF11477A2}" dt="2023-11-02T13:37:25.273" v="2" actId="478"/>
+          <ac:spMkLst>
+            <pc:docMk/>
+            <pc:sldMk cId="2230501479" sldId="257"/>
+            <ac:spMk id="306" creationId="{B4CA7901-5DBD-023C-40AF-83DF69C1EFDA}"/>
+          </ac:spMkLst>
+        </pc:spChg>
+        <pc:spChg chg="del">
+          <ac:chgData name="Fatima Pillosu" userId="a6295d4dc9e22643" providerId="LiveId" clId="{537A97E6-967C-44B8-A46F-A25AF11477A2}" dt="2023-11-02T13:37:27.821" v="4" actId="478"/>
+          <ac:spMkLst>
+            <pc:docMk/>
+            <pc:sldMk cId="2230501479" sldId="257"/>
+            <ac:spMk id="308" creationId="{4CD4775E-2630-9C87-6F3A-9951A2D20ED3}"/>
+          </ac:spMkLst>
+        </pc:spChg>
+        <pc:spChg chg="del">
+          <ac:chgData name="Fatima Pillosu" userId="a6295d4dc9e22643" providerId="LiveId" clId="{537A97E6-967C-44B8-A46F-A25AF11477A2}" dt="2023-11-02T13:37:21.639" v="0" actId="478"/>
+          <ac:spMkLst>
+            <pc:docMk/>
+            <pc:sldMk cId="2230501479" sldId="257"/>
+            <ac:spMk id="310" creationId="{954DA63F-C322-DDD1-4321-7866BEDF9F27}"/>
+          </ac:spMkLst>
+        </pc:spChg>
+        <pc:cxnChg chg="del">
+          <ac:chgData name="Fatima Pillosu" userId="a6295d4dc9e22643" providerId="LiveId" clId="{537A97E6-967C-44B8-A46F-A25AF11477A2}" dt="2023-11-02T13:37:28.390" v="5" actId="478"/>
+          <ac:cxnSpMkLst>
+            <pc:docMk/>
+            <pc:sldMk cId="2230501479" sldId="257"/>
+            <ac:cxnSpMk id="303" creationId="{0669BD32-4CFA-E029-1953-60C2A5ECFE87}"/>
+          </ac:cxnSpMkLst>
+        </pc:cxnChg>
+        <pc:cxnChg chg="del">
+          <ac:chgData name="Fatima Pillosu" userId="a6295d4dc9e22643" providerId="LiveId" clId="{537A97E6-967C-44B8-A46F-A25AF11477A2}" dt="2023-11-02T13:37:26.575" v="3" actId="478"/>
+          <ac:cxnSpMkLst>
+            <pc:docMk/>
+            <pc:sldMk cId="2230501479" sldId="257"/>
+            <ac:cxnSpMk id="305" creationId="{305D71CB-B233-CEB4-B3C2-4F20DD75B02D}"/>
+          </ac:cxnSpMkLst>
+        </pc:cxnChg>
+        <pc:cxnChg chg="del">
+          <ac:chgData name="Fatima Pillosu" userId="a6295d4dc9e22643" providerId="LiveId" clId="{537A97E6-967C-44B8-A46F-A25AF11477A2}" dt="2023-11-02T13:37:22.820" v="1" actId="478"/>
+          <ac:cxnSpMkLst>
+            <pc:docMk/>
+            <pc:sldMk cId="2230501479" sldId="257"/>
+            <ac:cxnSpMk id="311" creationId="{6C6532A5-8F65-E36A-EC45-E648F439AA14}"/>
           </ac:cxnSpMkLst>
         </pc:cxnChg>
       </pc:sldChg>
@@ -4287,7 +4359,7 @@
           <a:p>
             <a:fld id="{ECF8A5AB-4FEB-4DE2-90BB-D554FBAEAC0F}" type="datetimeFigureOut">
               <a:rPr lang="en-GB" smtClean="0"/>
-              <a:t>15/10/2023</a:t>
+              <a:t>02/11/2023</a:t>
             </a:fld>
             <a:endParaRPr lang="en-GB"/>
           </a:p>
@@ -4329,7 +4401,7 @@
           <a:p>
             <a:fld id="{C8412E9A-3B95-40E3-A7A7-1D9879B1CEE8}" type="slidenum">
               <a:rPr lang="en-GB" smtClean="0"/>
-              <a:t>‹N›</a:t>
+              <a:t>‹#›</a:t>
             </a:fld>
             <a:endParaRPr lang="en-GB"/>
           </a:p>
@@ -4457,7 +4529,7 @@
           <a:p>
             <a:fld id="{ECF8A5AB-4FEB-4DE2-90BB-D554FBAEAC0F}" type="datetimeFigureOut">
               <a:rPr lang="en-GB" smtClean="0"/>
-              <a:t>15/10/2023</a:t>
+              <a:t>02/11/2023</a:t>
             </a:fld>
             <a:endParaRPr lang="en-GB"/>
           </a:p>
@@ -4499,7 +4571,7 @@
           <a:p>
             <a:fld id="{C8412E9A-3B95-40E3-A7A7-1D9879B1CEE8}" type="slidenum">
               <a:rPr lang="en-GB" smtClean="0"/>
-              <a:t>‹N›</a:t>
+              <a:t>‹#›</a:t>
             </a:fld>
             <a:endParaRPr lang="en-GB"/>
           </a:p>
@@ -4637,7 +4709,7 @@
           <a:p>
             <a:fld id="{ECF8A5AB-4FEB-4DE2-90BB-D554FBAEAC0F}" type="datetimeFigureOut">
               <a:rPr lang="en-GB" smtClean="0"/>
-              <a:t>15/10/2023</a:t>
+              <a:t>02/11/2023</a:t>
             </a:fld>
             <a:endParaRPr lang="en-GB"/>
           </a:p>
@@ -4679,7 +4751,7 @@
           <a:p>
             <a:fld id="{C8412E9A-3B95-40E3-A7A7-1D9879B1CEE8}" type="slidenum">
               <a:rPr lang="en-GB" smtClean="0"/>
-              <a:t>‹N›</a:t>
+              <a:t>‹#›</a:t>
             </a:fld>
             <a:endParaRPr lang="en-GB"/>
           </a:p>
@@ -4807,7 +4879,7 @@
           <a:p>
             <a:fld id="{ECF8A5AB-4FEB-4DE2-90BB-D554FBAEAC0F}" type="datetimeFigureOut">
               <a:rPr lang="en-GB" smtClean="0"/>
-              <a:t>15/10/2023</a:t>
+              <a:t>02/11/2023</a:t>
             </a:fld>
             <a:endParaRPr lang="en-GB"/>
           </a:p>
@@ -4849,7 +4921,7 @@
           <a:p>
             <a:fld id="{C8412E9A-3B95-40E3-A7A7-1D9879B1CEE8}" type="slidenum">
               <a:rPr lang="en-GB" smtClean="0"/>
-              <a:t>‹N›</a:t>
+              <a:t>‹#›</a:t>
             </a:fld>
             <a:endParaRPr lang="en-GB"/>
           </a:p>
@@ -5053,7 +5125,7 @@
           <a:p>
             <a:fld id="{ECF8A5AB-4FEB-4DE2-90BB-D554FBAEAC0F}" type="datetimeFigureOut">
               <a:rPr lang="en-GB" smtClean="0"/>
-              <a:t>15/10/2023</a:t>
+              <a:t>02/11/2023</a:t>
             </a:fld>
             <a:endParaRPr lang="en-GB"/>
           </a:p>
@@ -5095,7 +5167,7 @@
           <a:p>
             <a:fld id="{C8412E9A-3B95-40E3-A7A7-1D9879B1CEE8}" type="slidenum">
               <a:rPr lang="en-GB" smtClean="0"/>
-              <a:t>‹N›</a:t>
+              <a:t>‹#›</a:t>
             </a:fld>
             <a:endParaRPr lang="en-GB"/>
           </a:p>
@@ -5285,7 +5357,7 @@
           <a:p>
             <a:fld id="{ECF8A5AB-4FEB-4DE2-90BB-D554FBAEAC0F}" type="datetimeFigureOut">
               <a:rPr lang="en-GB" smtClean="0"/>
-              <a:t>15/10/2023</a:t>
+              <a:t>02/11/2023</a:t>
             </a:fld>
             <a:endParaRPr lang="en-GB"/>
           </a:p>
@@ -5327,7 +5399,7 @@
           <a:p>
             <a:fld id="{C8412E9A-3B95-40E3-A7A7-1D9879B1CEE8}" type="slidenum">
               <a:rPr lang="en-GB" smtClean="0"/>
-              <a:t>‹N›</a:t>
+              <a:t>‹#›</a:t>
             </a:fld>
             <a:endParaRPr lang="en-GB"/>
           </a:p>
@@ -5652,7 +5724,7 @@
           <a:p>
             <a:fld id="{ECF8A5AB-4FEB-4DE2-90BB-D554FBAEAC0F}" type="datetimeFigureOut">
               <a:rPr lang="en-GB" smtClean="0"/>
-              <a:t>15/10/2023</a:t>
+              <a:t>02/11/2023</a:t>
             </a:fld>
             <a:endParaRPr lang="en-GB"/>
           </a:p>
@@ -5694,7 +5766,7 @@
           <a:p>
             <a:fld id="{C8412E9A-3B95-40E3-A7A7-1D9879B1CEE8}" type="slidenum">
               <a:rPr lang="en-GB" smtClean="0"/>
-              <a:t>‹N›</a:t>
+              <a:t>‹#›</a:t>
             </a:fld>
             <a:endParaRPr lang="en-GB"/>
           </a:p>
@@ -5770,7 +5842,7 @@
           <a:p>
             <a:fld id="{ECF8A5AB-4FEB-4DE2-90BB-D554FBAEAC0F}" type="datetimeFigureOut">
               <a:rPr lang="en-GB" smtClean="0"/>
-              <a:t>15/10/2023</a:t>
+              <a:t>02/11/2023</a:t>
             </a:fld>
             <a:endParaRPr lang="en-GB"/>
           </a:p>
@@ -5812,7 +5884,7 @@
           <a:p>
             <a:fld id="{C8412E9A-3B95-40E3-A7A7-1D9879B1CEE8}" type="slidenum">
               <a:rPr lang="en-GB" smtClean="0"/>
-              <a:t>‹N›</a:t>
+              <a:t>‹#›</a:t>
             </a:fld>
             <a:endParaRPr lang="en-GB"/>
           </a:p>
@@ -5865,7 +5937,7 @@
           <a:p>
             <a:fld id="{ECF8A5AB-4FEB-4DE2-90BB-D554FBAEAC0F}" type="datetimeFigureOut">
               <a:rPr lang="en-GB" smtClean="0"/>
-              <a:t>15/10/2023</a:t>
+              <a:t>02/11/2023</a:t>
             </a:fld>
             <a:endParaRPr lang="en-GB"/>
           </a:p>
@@ -5907,7 +5979,7 @@
           <a:p>
             <a:fld id="{C8412E9A-3B95-40E3-A7A7-1D9879B1CEE8}" type="slidenum">
               <a:rPr lang="en-GB" smtClean="0"/>
-              <a:t>‹N›</a:t>
+              <a:t>‹#›</a:t>
             </a:fld>
             <a:endParaRPr lang="en-GB"/>
           </a:p>
@@ -6142,7 +6214,7 @@
           <a:p>
             <a:fld id="{ECF8A5AB-4FEB-4DE2-90BB-D554FBAEAC0F}" type="datetimeFigureOut">
               <a:rPr lang="en-GB" smtClean="0"/>
-              <a:t>15/10/2023</a:t>
+              <a:t>02/11/2023</a:t>
             </a:fld>
             <a:endParaRPr lang="en-GB"/>
           </a:p>
@@ -6184,7 +6256,7 @@
           <a:p>
             <a:fld id="{C8412E9A-3B95-40E3-A7A7-1D9879B1CEE8}" type="slidenum">
               <a:rPr lang="en-GB" smtClean="0"/>
-              <a:t>‹N›</a:t>
+              <a:t>‹#›</a:t>
             </a:fld>
             <a:endParaRPr lang="en-GB"/>
           </a:p>
@@ -6399,7 +6471,7 @@
           <a:p>
             <a:fld id="{ECF8A5AB-4FEB-4DE2-90BB-D554FBAEAC0F}" type="datetimeFigureOut">
               <a:rPr lang="en-GB" smtClean="0"/>
-              <a:t>15/10/2023</a:t>
+              <a:t>02/11/2023</a:t>
             </a:fld>
             <a:endParaRPr lang="en-GB"/>
           </a:p>
@@ -6441,7 +6513,7 @@
           <a:p>
             <a:fld id="{C8412E9A-3B95-40E3-A7A7-1D9879B1CEE8}" type="slidenum">
               <a:rPr lang="en-GB" smtClean="0"/>
-              <a:t>‹N›</a:t>
+              <a:t>‹#›</a:t>
             </a:fld>
             <a:endParaRPr lang="en-GB"/>
           </a:p>
@@ -6612,7 +6684,7 @@
           <a:p>
             <a:fld id="{ECF8A5AB-4FEB-4DE2-90BB-D554FBAEAC0F}" type="datetimeFigureOut">
               <a:rPr lang="en-GB" smtClean="0"/>
-              <a:t>15/10/2023</a:t>
+              <a:t>02/11/2023</a:t>
             </a:fld>
             <a:endParaRPr lang="en-GB"/>
           </a:p>
@@ -6690,7 +6762,7 @@
           <a:p>
             <a:fld id="{C8412E9A-3B95-40E3-A7A7-1D9879B1CEE8}" type="slidenum">
               <a:rPr lang="en-GB" smtClean="0"/>
-              <a:t>‹N›</a:t>
+              <a:t>‹#›</a:t>
             </a:fld>
             <a:endParaRPr lang="en-GB"/>
           </a:p>
@@ -11173,7 +11245,7 @@
         </p:nvSpPr>
         <p:spPr>
           <a:xfrm>
-            <a:off x="5429396" y="3123983"/>
+            <a:off x="5429396" y="2907099"/>
             <a:ext cx="1385926" cy="246221"/>
           </a:xfrm>
           <a:prstGeom prst="rect">
@@ -11233,214 +11305,6 @@
           </a:p>
         </p:txBody>
       </p:sp>
-      <p:cxnSp>
-        <p:nvCxnSpPr>
-          <p:cNvPr id="303" name="Connettore diritto 302">
-            <a:extLst>
-              <a:ext uri="{FF2B5EF4-FFF2-40B4-BE49-F238E27FC236}">
-                <a16:creationId xmlns:a16="http://schemas.microsoft.com/office/drawing/2014/main" id="{0669BD32-4CFA-E029-1953-60C2A5ECFE87}"/>
-              </a:ext>
-            </a:extLst>
-          </p:cNvPr>
-          <p:cNvCxnSpPr>
-            <a:cxnSpLocks/>
-          </p:cNvCxnSpPr>
-          <p:nvPr/>
-        </p:nvCxnSpPr>
-        <p:spPr>
-          <a:xfrm>
-            <a:off x="5948183" y="2619588"/>
-            <a:ext cx="0" cy="274509"/>
-          </a:xfrm>
-          <a:prstGeom prst="line">
-            <a:avLst/>
-          </a:prstGeom>
-          <a:ln>
-            <a:solidFill>
-              <a:schemeClr val="accent6">
-                <a:lumMod val="60000"/>
-                <a:lumOff val="40000"/>
-              </a:schemeClr>
-            </a:solidFill>
-            <a:prstDash val="dash"/>
-          </a:ln>
-        </p:spPr>
-        <p:style>
-          <a:lnRef idx="1">
-            <a:schemeClr val="accent1"/>
-          </a:lnRef>
-          <a:fillRef idx="0">
-            <a:schemeClr val="accent1"/>
-          </a:fillRef>
-          <a:effectRef idx="0">
-            <a:schemeClr val="accent1"/>
-          </a:effectRef>
-          <a:fontRef idx="minor">
-            <a:schemeClr val="tx1"/>
-          </a:fontRef>
-        </p:style>
-      </p:cxnSp>
-      <p:sp>
-        <p:nvSpPr>
-          <p:cNvPr id="304" name="CasellaDiTesto 303">
-            <a:extLst>
-              <a:ext uri="{FF2B5EF4-FFF2-40B4-BE49-F238E27FC236}">
-                <a16:creationId xmlns:a16="http://schemas.microsoft.com/office/drawing/2014/main" id="{A6E8B822-9EEE-8BF3-9A9C-D65596F5E22B}"/>
-              </a:ext>
-            </a:extLst>
-          </p:cNvPr>
-          <p:cNvSpPr txBox="1"/>
-          <p:nvPr/>
-        </p:nvSpPr>
-        <p:spPr>
-          <a:xfrm>
-            <a:off x="5438876" y="2880117"/>
-            <a:ext cx="1142779" cy="276999"/>
-          </a:xfrm>
-          <a:prstGeom prst="rect">
-            <a:avLst/>
-          </a:prstGeom>
-          <a:noFill/>
-        </p:spPr>
-        <p:txBody>
-          <a:bodyPr wrap="square" rtlCol="0">
-            <a:spAutoFit/>
-          </a:bodyPr>
-          <a:lstStyle/>
-          <a:p>
-            <a:pPr algn="ctr"/>
-            <a:r>
-              <a:rPr lang="it-IT" sz="1200" b="1" dirty="0">
-                <a:solidFill>
-                  <a:srgbClr val="7030A0"/>
-                </a:solidFill>
-              </a:rPr>
-              <a:t>tp(25</a:t>
-            </a:r>
-            <a:r>
-              <a:rPr lang="it-IT" sz="1200" b="1" baseline="30000" dirty="0">
-                <a:solidFill>
-                  <a:srgbClr val="7030A0"/>
-                </a:solidFill>
-              </a:rPr>
-              <a:t>th</a:t>
-            </a:r>
-            <a:r>
-              <a:rPr lang="it-IT" sz="1200" b="1" dirty="0">
-                <a:solidFill>
-                  <a:srgbClr val="7030A0"/>
-                </a:solidFill>
-              </a:rPr>
-              <a:t>) = VRT</a:t>
-            </a:r>
-            <a:endParaRPr lang="en-GB" sz="1200" b="1" dirty="0">
-              <a:solidFill>
-                <a:srgbClr val="7030A0"/>
-              </a:solidFill>
-            </a:endParaRPr>
-          </a:p>
-        </p:txBody>
-      </p:sp>
-      <p:cxnSp>
-        <p:nvCxnSpPr>
-          <p:cNvPr id="305" name="Connettore diritto 304">
-            <a:extLst>
-              <a:ext uri="{FF2B5EF4-FFF2-40B4-BE49-F238E27FC236}">
-                <a16:creationId xmlns:a16="http://schemas.microsoft.com/office/drawing/2014/main" id="{305D71CB-B233-CEB4-B3C2-4F20DD75B02D}"/>
-              </a:ext>
-            </a:extLst>
-          </p:cNvPr>
-          <p:cNvCxnSpPr>
-            <a:cxnSpLocks/>
-          </p:cNvCxnSpPr>
-          <p:nvPr/>
-        </p:nvCxnSpPr>
-        <p:spPr>
-          <a:xfrm flipH="1">
-            <a:off x="5419419" y="2601422"/>
-            <a:ext cx="540000" cy="0"/>
-          </a:xfrm>
-          <a:prstGeom prst="line">
-            <a:avLst/>
-          </a:prstGeom>
-          <a:ln>
-            <a:solidFill>
-              <a:schemeClr val="accent6">
-                <a:lumMod val="60000"/>
-                <a:lumOff val="40000"/>
-              </a:schemeClr>
-            </a:solidFill>
-            <a:prstDash val="dash"/>
-          </a:ln>
-        </p:spPr>
-        <p:style>
-          <a:lnRef idx="1">
-            <a:schemeClr val="accent1"/>
-          </a:lnRef>
-          <a:fillRef idx="0">
-            <a:schemeClr val="accent1"/>
-          </a:fillRef>
-          <a:effectRef idx="0">
-            <a:schemeClr val="accent1"/>
-          </a:effectRef>
-          <a:fontRef idx="minor">
-            <a:schemeClr val="tx1"/>
-          </a:fontRef>
-        </p:style>
-      </p:cxnSp>
-      <p:sp>
-        <p:nvSpPr>
-          <p:cNvPr id="306" name="CasellaDiTesto 305">
-            <a:extLst>
-              <a:ext uri="{FF2B5EF4-FFF2-40B4-BE49-F238E27FC236}">
-                <a16:creationId xmlns:a16="http://schemas.microsoft.com/office/drawing/2014/main" id="{B4CA7901-5DBD-023C-40AF-83DF69C1EFDA}"/>
-              </a:ext>
-            </a:extLst>
-          </p:cNvPr>
-          <p:cNvSpPr txBox="1"/>
-          <p:nvPr/>
-        </p:nvSpPr>
-        <p:spPr>
-          <a:xfrm>
-            <a:off x="4871604" y="2475514"/>
-            <a:ext cx="814191" cy="246221"/>
-          </a:xfrm>
-          <a:prstGeom prst="rect">
-            <a:avLst/>
-          </a:prstGeom>
-          <a:noFill/>
-        </p:spPr>
-        <p:txBody>
-          <a:bodyPr wrap="square" rtlCol="0">
-            <a:spAutoFit/>
-          </a:bodyPr>
-          <a:lstStyle/>
-          <a:p>
-            <a:pPr algn="ctr"/>
-            <a:r>
-              <a:rPr lang="it-IT" sz="1000" dirty="0">
-                <a:solidFill>
-                  <a:srgbClr val="7030A0"/>
-                </a:solidFill>
-              </a:rPr>
-              <a:t>25</a:t>
-            </a:r>
-            <a:r>
-              <a:rPr lang="it-IT" sz="1000" baseline="30000" dirty="0">
-                <a:solidFill>
-                  <a:srgbClr val="7030A0"/>
-                </a:solidFill>
-              </a:rPr>
-              <a:t>th</a:t>
-            </a:r>
-            <a:endParaRPr lang="en-GB" sz="1000" dirty="0">
-              <a:solidFill>
-                <a:srgbClr val="7030A0"/>
-              </a:solidFill>
-            </a:endParaRPr>
-          </a:p>
-        </p:txBody>
-      </p:sp>
       <p:sp>
         <p:nvSpPr>
           <p:cNvPr id="307" name="CasellaDiTesto 306">
@@ -11494,58 +11358,6 @@
               </a:rPr>
               <a:t>) values</a:t>
             </a:r>
-          </a:p>
-        </p:txBody>
-      </p:sp>
-      <p:sp>
-        <p:nvSpPr>
-          <p:cNvPr id="308" name="Ovale 307">
-            <a:extLst>
-              <a:ext uri="{FF2B5EF4-FFF2-40B4-BE49-F238E27FC236}">
-                <a16:creationId xmlns:a16="http://schemas.microsoft.com/office/drawing/2014/main" id="{4CD4775E-2630-9C87-6F3A-9951A2D20ED3}"/>
-              </a:ext>
-            </a:extLst>
-          </p:cNvPr>
-          <p:cNvSpPr/>
-          <p:nvPr/>
-        </p:nvSpPr>
-        <p:spPr>
-          <a:xfrm>
-            <a:off x="5906368" y="2577485"/>
-            <a:ext cx="72000" cy="72000"/>
-          </a:xfrm>
-          <a:prstGeom prst="ellipse">
-            <a:avLst/>
-          </a:prstGeom>
-          <a:solidFill>
-            <a:srgbClr val="7030A0"/>
-          </a:solidFill>
-          <a:ln>
-            <a:noFill/>
-          </a:ln>
-        </p:spPr>
-        <p:style>
-          <a:lnRef idx="2">
-            <a:schemeClr val="accent1">
-              <a:shade val="50000"/>
-            </a:schemeClr>
-          </a:lnRef>
-          <a:fillRef idx="1">
-            <a:schemeClr val="accent1"/>
-          </a:fillRef>
-          <a:effectRef idx="0">
-            <a:schemeClr val="accent1"/>
-          </a:effectRef>
-          <a:fontRef idx="minor">
-            <a:schemeClr val="lt1"/>
-          </a:fontRef>
-        </p:style>
-        <p:txBody>
-          <a:bodyPr rtlCol="0" anchor="ctr"/>
-          <a:lstStyle/>
-          <a:p>
-            <a:pPr algn="ctr"/>
-            <a:endParaRPr lang="en-GB"/>
           </a:p>
         </p:txBody>
       </p:sp>
@@ -11591,96 +11403,6 @@
           </a:p>
         </p:txBody>
       </p:sp>
-      <p:sp>
-        <p:nvSpPr>
-          <p:cNvPr id="310" name="CasellaDiTesto 157">
-            <a:extLst>
-              <a:ext uri="{FF2B5EF4-FFF2-40B4-BE49-F238E27FC236}">
-                <a16:creationId xmlns:a16="http://schemas.microsoft.com/office/drawing/2014/main" id="{954DA63F-C322-DDD1-4321-7866BEDF9F27}"/>
-              </a:ext>
-            </a:extLst>
-          </p:cNvPr>
-          <p:cNvSpPr txBox="1"/>
-          <p:nvPr/>
-        </p:nvSpPr>
-        <p:spPr>
-          <a:xfrm>
-            <a:off x="5379281" y="1697902"/>
-            <a:ext cx="915130" cy="553998"/>
-          </a:xfrm>
-          <a:prstGeom prst="rect">
-            <a:avLst/>
-          </a:prstGeom>
-          <a:noFill/>
-        </p:spPr>
-        <p:txBody>
-          <a:bodyPr wrap="square" rtlCol="0">
-            <a:spAutoFit/>
-          </a:bodyPr>
-          <a:lstStyle/>
-          <a:p>
-            <a:pPr algn="ctr"/>
-            <a:r>
-              <a:rPr lang="en-GB" sz="1000" dirty="0">
-                <a:solidFill>
-                  <a:schemeClr val="tx1">
-                    <a:lumMod val="85000"/>
-                    <a:lumOff val="15000"/>
-                  </a:schemeClr>
-                </a:solidFill>
-              </a:rPr>
-              <a:t>75% of point flood reports retained</a:t>
-            </a:r>
-          </a:p>
-        </p:txBody>
-      </p:sp>
-      <p:cxnSp>
-        <p:nvCxnSpPr>
-          <p:cNvPr id="311" name="Straight Arrow Connector 2">
-            <a:extLst>
-              <a:ext uri="{FF2B5EF4-FFF2-40B4-BE49-F238E27FC236}">
-                <a16:creationId xmlns:a16="http://schemas.microsoft.com/office/drawing/2014/main" id="{6C6532A5-8F65-E36A-EC45-E648F439AA14}"/>
-              </a:ext>
-            </a:extLst>
-          </p:cNvPr>
-          <p:cNvCxnSpPr>
-            <a:cxnSpLocks/>
-          </p:cNvCxnSpPr>
-          <p:nvPr/>
-        </p:nvCxnSpPr>
-        <p:spPr>
-          <a:xfrm flipH="1">
-            <a:off x="5479482" y="2209946"/>
-            <a:ext cx="223149" cy="365923"/>
-          </a:xfrm>
-          <a:prstGeom prst="straightConnector1">
-            <a:avLst/>
-          </a:prstGeom>
-          <a:ln w="3175">
-            <a:solidFill>
-              <a:schemeClr val="tx1">
-                <a:lumMod val="85000"/>
-                <a:lumOff val="15000"/>
-              </a:schemeClr>
-            </a:solidFill>
-            <a:tailEnd type="triangle"/>
-          </a:ln>
-        </p:spPr>
-        <p:style>
-          <a:lnRef idx="1">
-            <a:schemeClr val="accent1"/>
-          </a:lnRef>
-          <a:fillRef idx="0">
-            <a:schemeClr val="accent1"/>
-          </a:fillRef>
-          <a:effectRef idx="0">
-            <a:schemeClr val="accent1"/>
-          </a:effectRef>
-          <a:fontRef idx="minor">
-            <a:schemeClr val="tx1"/>
-          </a:fontRef>
-        </p:style>
-      </p:cxnSp>
       <p:sp>
         <p:nvSpPr>
           <p:cNvPr id="312" name="CasellaDiTesto 146">

</xml_diff>